<commit_message>
Initial Add of Act questions
</commit_message>
<xml_diff>
--- a/It’s so easy, Tyler can do it.pptx
+++ b/It’s so easy, Tyler can do it.pptx
@@ -11,6 +11,9 @@
     <p:sldId id="258" r:id="rId5"/>
     <p:sldId id="259" r:id="rId6"/>
     <p:sldId id="260" r:id="rId7"/>
+    <p:sldId id="263" r:id="rId8"/>
+    <p:sldId id="264" r:id="rId9"/>
+    <p:sldId id="265" r:id="rId10"/>
   </p:sldIdLst>
   <p:sldSz cx="12192000" cy="6858000"/>
   <p:notesSz cx="6858000" cy="9144000"/>
@@ -269,7 +272,7 @@
           <a:p>
             <a:fld id="{6A89FA28-2061-4CF2-9A1A-C9FDCD506C32}" type="datetimeFigureOut">
               <a:rPr lang="en-US" smtClean="0"/>
-              <a:t>10/9/2020</a:t>
+              <a:t>10/13/2020</a:t>
             </a:fld>
             <a:endParaRPr lang="en-US"/>
           </a:p>
@@ -512,7 +515,7 @@
           <a:p>
             <a:fld id="{6A89FA28-2061-4CF2-9A1A-C9FDCD506C32}" type="datetimeFigureOut">
               <a:rPr lang="en-US" smtClean="0"/>
-              <a:t>10/9/2020</a:t>
+              <a:t>10/13/2020</a:t>
             </a:fld>
             <a:endParaRPr lang="en-US"/>
           </a:p>
@@ -692,7 +695,7 @@
           <a:p>
             <a:fld id="{6A89FA28-2061-4CF2-9A1A-C9FDCD506C32}" type="datetimeFigureOut">
               <a:rPr lang="en-US" smtClean="0"/>
-              <a:t>10/9/2020</a:t>
+              <a:t>10/13/2020</a:t>
             </a:fld>
             <a:endParaRPr lang="en-US"/>
           </a:p>
@@ -897,7 +900,7 @@
           <a:p>
             <a:fld id="{6A89FA28-2061-4CF2-9A1A-C9FDCD506C32}" type="datetimeFigureOut">
               <a:rPr lang="en-US" smtClean="0"/>
-              <a:t>10/9/2020</a:t>
+              <a:t>10/13/2020</a:t>
             </a:fld>
             <a:endParaRPr lang="en-US"/>
           </a:p>
@@ -1154,7 +1157,7 @@
           <a:p>
             <a:fld id="{6A89FA28-2061-4CF2-9A1A-C9FDCD506C32}" type="datetimeFigureOut">
               <a:rPr lang="en-US" smtClean="0"/>
-              <a:t>10/9/2020</a:t>
+              <a:t>10/13/2020</a:t>
             </a:fld>
             <a:endParaRPr lang="en-US"/>
           </a:p>
@@ -1501,7 +1504,7 @@
           <a:p>
             <a:fld id="{6A89FA28-2061-4CF2-9A1A-C9FDCD506C32}" type="datetimeFigureOut">
               <a:rPr lang="en-US" smtClean="0"/>
-              <a:t>10/9/2020</a:t>
+              <a:t>10/13/2020</a:t>
             </a:fld>
             <a:endParaRPr lang="en-US"/>
           </a:p>
@@ -1903,7 +1906,7 @@
           <a:p>
             <a:fld id="{6A89FA28-2061-4CF2-9A1A-C9FDCD506C32}" type="datetimeFigureOut">
               <a:rPr lang="en-US" smtClean="0"/>
-              <a:t>10/9/2020</a:t>
+              <a:t>10/13/2020</a:t>
             </a:fld>
             <a:endParaRPr lang="en-US"/>
           </a:p>
@@ -2021,7 +2024,7 @@
           <a:p>
             <a:fld id="{6A89FA28-2061-4CF2-9A1A-C9FDCD506C32}" type="datetimeFigureOut">
               <a:rPr lang="en-US" smtClean="0"/>
-              <a:t>10/9/2020</a:t>
+              <a:t>10/13/2020</a:t>
             </a:fld>
             <a:endParaRPr lang="en-US"/>
           </a:p>
@@ -2116,7 +2119,7 @@
           <a:p>
             <a:fld id="{6A89FA28-2061-4CF2-9A1A-C9FDCD506C32}" type="datetimeFigureOut">
               <a:rPr lang="en-US" smtClean="0"/>
-              <a:t>10/9/2020</a:t>
+              <a:t>10/13/2020</a:t>
             </a:fld>
             <a:endParaRPr lang="en-US"/>
           </a:p>
@@ -2406,7 +2409,7 @@
           <a:p>
             <a:fld id="{6A89FA28-2061-4CF2-9A1A-C9FDCD506C32}" type="datetimeFigureOut">
               <a:rPr lang="en-US" smtClean="0"/>
-              <a:t>10/9/2020</a:t>
+              <a:t>10/13/2020</a:t>
             </a:fld>
             <a:endParaRPr lang="en-US"/>
           </a:p>
@@ -2686,7 +2689,7 @@
           <a:p>
             <a:fld id="{6A89FA28-2061-4CF2-9A1A-C9FDCD506C32}" type="datetimeFigureOut">
               <a:rPr lang="en-US" smtClean="0"/>
-              <a:t>10/9/2020</a:t>
+              <a:t>10/13/2020</a:t>
             </a:fld>
             <a:endParaRPr lang="en-US"/>
           </a:p>
@@ -2936,7 +2939,7 @@
           <a:p>
             <a:fld id="{6A89FA28-2061-4CF2-9A1A-C9FDCD506C32}" type="datetimeFigureOut">
               <a:rPr lang="en-US" smtClean="0"/>
-              <a:t>10/9/2020</a:t>
+              <a:t>10/13/2020</a:t>
             </a:fld>
             <a:endParaRPr lang="en-US"/>
           </a:p>
@@ -3763,11 +3766,7 @@
             <a:pPr lvl="2"/>
             <a:r>
               <a:rPr lang="en-US" dirty="0" smtClean="0"/>
-              <a:t>Queue (1</a:t>
-            </a:r>
-            <a:r>
-              <a:rPr lang="en-US" dirty="0" smtClean="0"/>
-              <a:t>)</a:t>
+              <a:t>Queue (1)</a:t>
             </a:r>
             <a:endParaRPr lang="en-US" dirty="0"/>
           </a:p>
@@ -3995,6 +3994,336 @@
     <p:extLst>
       <p:ext uri="{BB962C8B-B14F-4D97-AF65-F5344CB8AC3E}">
         <p14:creationId xmlns:p14="http://schemas.microsoft.com/office/powerpoint/2010/main" val="2975521659"/>
+      </p:ext>
+    </p:extLst>
+  </p:cSld>
+  <p:clrMapOvr>
+    <a:masterClrMapping/>
+  </p:clrMapOvr>
+</p:sld>
+</file>
+
+<file path=ppt/slides/slide7.xml><?xml version="1.0" encoding="utf-8"?>
+<p:sld xmlns:a="http://schemas.openxmlformats.org/drawingml/2006/main" xmlns:r="http://schemas.openxmlformats.org/officeDocument/2006/relationships" xmlns:p="http://schemas.openxmlformats.org/presentationml/2006/main">
+  <p:cSld>
+    <p:spTree>
+      <p:nvGrpSpPr>
+        <p:cNvPr id="1" name=""/>
+        <p:cNvGrpSpPr/>
+        <p:nvPr/>
+      </p:nvGrpSpPr>
+      <p:grpSpPr>
+        <a:xfrm>
+          <a:off x="0" y="0"/>
+          <a:ext cx="0" cy="0"/>
+          <a:chOff x="0" y="0"/>
+          <a:chExt cx="0" cy="0"/>
+        </a:xfrm>
+      </p:grpSpPr>
+      <p:sp>
+        <p:nvSpPr>
+          <p:cNvPr id="2" name="Title 1"/>
+          <p:cNvSpPr>
+            <a:spLocks noGrp="1"/>
+          </p:cNvSpPr>
+          <p:nvPr>
+            <p:ph type="title"/>
+          </p:nvPr>
+        </p:nvSpPr>
+        <p:spPr/>
+        <p:txBody>
+          <a:bodyPr/>
+          <a:lstStyle/>
+          <a:p>
+            <a:r>
+              <a:rPr lang="en-US" dirty="0" smtClean="0"/>
+              <a:t>Act Q1</a:t>
+            </a:r>
+            <a:endParaRPr lang="en-US" dirty="0"/>
+          </a:p>
+        </p:txBody>
+      </p:sp>
+      <p:sp>
+        <p:nvSpPr>
+          <p:cNvPr id="3" name="Content Placeholder 2"/>
+          <p:cNvSpPr>
+            <a:spLocks noGrp="1"/>
+          </p:cNvSpPr>
+          <p:nvPr>
+            <p:ph idx="1"/>
+          </p:nvPr>
+        </p:nvSpPr>
+        <p:spPr/>
+        <p:txBody>
+          <a:bodyPr/>
+          <a:lstStyle/>
+          <a:p>
+            <a:r>
+              <a:rPr lang="en-US" dirty="0" smtClean="0"/>
+              <a:t>Based on this method, fill in the blanks to create an actionable ad hoc task:</a:t>
+            </a:r>
+          </a:p>
+          <a:p>
+            <a:pPr lvl="1"/>
+            <a:endParaRPr lang="en-US" dirty="0"/>
+          </a:p>
+        </p:txBody>
+      </p:sp>
+      <p:pic>
+        <p:nvPicPr>
+          <p:cNvPr id="4" name="Picture 3"/>
+          <p:cNvPicPr>
+            <a:picLocks noChangeAspect="1"/>
+          </p:cNvPicPr>
+          <p:nvPr/>
+        </p:nvPicPr>
+        <p:blipFill>
+          <a:blip r:embed="rId2"/>
+          <a:stretch>
+            <a:fillRect/>
+          </a:stretch>
+        </p:blipFill>
+        <p:spPr>
+          <a:xfrm>
+            <a:off x="35813" y="2995884"/>
+            <a:ext cx="12093049" cy="2028825"/>
+          </a:xfrm>
+          <a:prstGeom prst="rect">
+            <a:avLst/>
+          </a:prstGeom>
+        </p:spPr>
+      </p:pic>
+    </p:spTree>
+    <p:extLst>
+      <p:ext uri="{BB962C8B-B14F-4D97-AF65-F5344CB8AC3E}">
+        <p14:creationId xmlns:p14="http://schemas.microsoft.com/office/powerpoint/2010/main" val="180562363"/>
+      </p:ext>
+    </p:extLst>
+  </p:cSld>
+  <p:clrMapOvr>
+    <a:masterClrMapping/>
+  </p:clrMapOvr>
+</p:sld>
+</file>
+
+<file path=ppt/slides/slide8.xml><?xml version="1.0" encoding="utf-8"?>
+<p:sld xmlns:a="http://schemas.openxmlformats.org/drawingml/2006/main" xmlns:r="http://schemas.openxmlformats.org/officeDocument/2006/relationships" xmlns:p="http://schemas.openxmlformats.org/presentationml/2006/main">
+  <p:cSld>
+    <p:spTree>
+      <p:nvGrpSpPr>
+        <p:cNvPr id="1" name=""/>
+        <p:cNvGrpSpPr/>
+        <p:nvPr/>
+      </p:nvGrpSpPr>
+      <p:grpSpPr>
+        <a:xfrm>
+          <a:off x="0" y="0"/>
+          <a:ext cx="0" cy="0"/>
+          <a:chOff x="0" y="0"/>
+          <a:chExt cx="0" cy="0"/>
+        </a:xfrm>
+      </p:grpSpPr>
+      <p:sp>
+        <p:nvSpPr>
+          <p:cNvPr id="2" name="Title 1"/>
+          <p:cNvSpPr>
+            <a:spLocks noGrp="1"/>
+          </p:cNvSpPr>
+          <p:nvPr>
+            <p:ph type="title"/>
+          </p:nvPr>
+        </p:nvSpPr>
+        <p:spPr/>
+        <p:txBody>
+          <a:bodyPr/>
+          <a:lstStyle/>
+          <a:p>
+            <a:r>
+              <a:rPr lang="en-US" dirty="0" smtClean="0"/>
+              <a:t>Act Q2</a:t>
+            </a:r>
+            <a:endParaRPr lang="en-US" dirty="0"/>
+          </a:p>
+        </p:txBody>
+      </p:sp>
+      <p:sp>
+        <p:nvSpPr>
+          <p:cNvPr id="3" name="Content Placeholder 2"/>
+          <p:cNvSpPr>
+            <a:spLocks noGrp="1"/>
+          </p:cNvSpPr>
+          <p:nvPr>
+            <p:ph idx="1"/>
+          </p:nvPr>
+        </p:nvSpPr>
+        <p:spPr/>
+        <p:txBody>
+          <a:bodyPr/>
+          <a:lstStyle/>
+          <a:p>
+            <a:r>
+              <a:rPr lang="en-US" sz="2800" dirty="0" smtClean="0"/>
+              <a:t>Let’s take your filled in method and add it to your test.</a:t>
+            </a:r>
+          </a:p>
+          <a:p>
+            <a:pPr lvl="1"/>
+            <a:r>
+              <a:rPr lang="en-US" sz="2400" dirty="0" smtClean="0"/>
+              <a:t>Tips:</a:t>
+            </a:r>
+          </a:p>
+          <a:p>
+            <a:pPr lvl="2"/>
+            <a:r>
+              <a:rPr lang="en-US" sz="2400" dirty="0" smtClean="0"/>
+              <a:t>The method is off </a:t>
+            </a:r>
+            <a:r>
+              <a:rPr lang="en-US" sz="2400" dirty="0" err="1" smtClean="0"/>
+              <a:t>ITaskExecutionService</a:t>
+            </a:r>
+            <a:r>
+              <a:rPr lang="en-US" sz="2400" dirty="0" smtClean="0"/>
+              <a:t>.</a:t>
+            </a:r>
+          </a:p>
+          <a:p>
+            <a:pPr lvl="2"/>
+            <a:r>
+              <a:rPr lang="en-US" sz="2400" dirty="0" smtClean="0"/>
+              <a:t>In this instance, we will not return anything.</a:t>
+            </a:r>
+            <a:endParaRPr lang="en-US" sz="2400" dirty="0"/>
+          </a:p>
+        </p:txBody>
+      </p:sp>
+    </p:spTree>
+    <p:extLst>
+      <p:ext uri="{BB962C8B-B14F-4D97-AF65-F5344CB8AC3E}">
+        <p14:creationId xmlns:p14="http://schemas.microsoft.com/office/powerpoint/2010/main" val="3214253470"/>
+      </p:ext>
+    </p:extLst>
+  </p:cSld>
+  <p:clrMapOvr>
+    <a:masterClrMapping/>
+  </p:clrMapOvr>
+</p:sld>
+</file>
+
+<file path=ppt/slides/slide9.xml><?xml version="1.0" encoding="utf-8"?>
+<p:sld xmlns:a="http://schemas.openxmlformats.org/drawingml/2006/main" xmlns:r="http://schemas.openxmlformats.org/officeDocument/2006/relationships" xmlns:p="http://schemas.openxmlformats.org/presentationml/2006/main">
+  <p:cSld>
+    <p:spTree>
+      <p:nvGrpSpPr>
+        <p:cNvPr id="1" name=""/>
+        <p:cNvGrpSpPr/>
+        <p:nvPr/>
+      </p:nvGrpSpPr>
+      <p:grpSpPr>
+        <a:xfrm>
+          <a:off x="0" y="0"/>
+          <a:ext cx="0" cy="0"/>
+          <a:chOff x="0" y="0"/>
+          <a:chExt cx="0" cy="0"/>
+        </a:xfrm>
+      </p:grpSpPr>
+      <p:sp>
+        <p:nvSpPr>
+          <p:cNvPr id="2" name="Title 1"/>
+          <p:cNvSpPr>
+            <a:spLocks noGrp="1"/>
+          </p:cNvSpPr>
+          <p:nvPr>
+            <p:ph type="title"/>
+          </p:nvPr>
+        </p:nvSpPr>
+        <p:spPr/>
+        <p:txBody>
+          <a:bodyPr/>
+          <a:lstStyle/>
+          <a:p>
+            <a:r>
+              <a:rPr lang="en-US" dirty="0" smtClean="0"/>
+              <a:t>Act Q3</a:t>
+            </a:r>
+            <a:endParaRPr lang="en-US" dirty="0"/>
+          </a:p>
+        </p:txBody>
+      </p:sp>
+      <p:sp>
+        <p:nvSpPr>
+          <p:cNvPr id="3" name="Content Placeholder 2"/>
+          <p:cNvSpPr>
+            <a:spLocks noGrp="1"/>
+          </p:cNvSpPr>
+          <p:nvPr>
+            <p:ph idx="1"/>
+          </p:nvPr>
+        </p:nvSpPr>
+        <p:spPr/>
+        <p:txBody>
+          <a:bodyPr/>
+          <a:lstStyle/>
+          <a:p>
+            <a:r>
+              <a:rPr lang="en-US" sz="2800" dirty="0" smtClean="0"/>
+              <a:t>Using </a:t>
+            </a:r>
+            <a:r>
+              <a:rPr lang="en-US" sz="2800" dirty="0" err="1" smtClean="0"/>
+              <a:t>Intellisense</a:t>
+            </a:r>
+            <a:r>
+              <a:rPr lang="en-US" sz="2800" dirty="0" smtClean="0"/>
+              <a:t>, create a new variable and set the value as the method return.</a:t>
+            </a:r>
+          </a:p>
+          <a:p>
+            <a:pPr lvl="1"/>
+            <a:r>
+              <a:rPr lang="en-US" sz="2400" dirty="0" smtClean="0"/>
+              <a:t>No using “</a:t>
+            </a:r>
+            <a:r>
+              <a:rPr lang="en-US" sz="2400" dirty="0" err="1" smtClean="0"/>
+              <a:t>var</a:t>
+            </a:r>
+            <a:r>
+              <a:rPr lang="en-US" sz="2400" dirty="0" smtClean="0"/>
+              <a:t>”!</a:t>
+            </a:r>
+          </a:p>
+          <a:p>
+            <a:pPr lvl="2"/>
+            <a:r>
+              <a:rPr lang="en-US" sz="2400" dirty="0" smtClean="0"/>
+              <a:t>(“</a:t>
+            </a:r>
+            <a:r>
+              <a:rPr lang="en-US" sz="2400" dirty="0" err="1" smtClean="0"/>
+              <a:t>var</a:t>
+            </a:r>
+            <a:r>
+              <a:rPr lang="en-US" sz="2400" dirty="0" smtClean="0"/>
+              <a:t>” should only </a:t>
+            </a:r>
+            <a:r>
+              <a:rPr lang="en-US" sz="2400" smtClean="0"/>
+              <a:t>been used when </a:t>
+            </a:r>
+            <a:r>
+              <a:rPr lang="en-US" sz="2400" dirty="0" smtClean="0"/>
+              <a:t>quickly testing but never keep it in your code.)</a:t>
+            </a:r>
+            <a:endParaRPr lang="en-US" sz="2400" dirty="0"/>
+          </a:p>
+        </p:txBody>
+      </p:sp>
+    </p:spTree>
+    <p:extLst>
+      <p:ext uri="{BB962C8B-B14F-4D97-AF65-F5344CB8AC3E}">
+        <p14:creationId xmlns:p14="http://schemas.microsoft.com/office/powerpoint/2010/main" val="4176592627"/>
       </p:ext>
     </p:extLst>
   </p:cSld>

</xml_diff>

<commit_message>
Initial Add of Assert Questions and Answers
</commit_message>
<xml_diff>
--- a/It’s so easy, Tyler can do it.pptx
+++ b/It’s so easy, Tyler can do it.pptx
@@ -14,6 +14,9 @@
     <p:sldId id="263" r:id="rId8"/>
     <p:sldId id="264" r:id="rId9"/>
     <p:sldId id="265" r:id="rId10"/>
+    <p:sldId id="266" r:id="rId11"/>
+    <p:sldId id="267" r:id="rId12"/>
+    <p:sldId id="268" r:id="rId13"/>
   </p:sldIdLst>
   <p:sldSz cx="12192000" cy="6858000"/>
   <p:notesSz cx="6858000" cy="9144000"/>
@@ -3500,6 +3503,321 @@
 </p:sld>
 </file>
 
+<file path=ppt/slides/slide10.xml><?xml version="1.0" encoding="utf-8"?>
+<p:sld xmlns:a="http://schemas.openxmlformats.org/drawingml/2006/main" xmlns:r="http://schemas.openxmlformats.org/officeDocument/2006/relationships" xmlns:p="http://schemas.openxmlformats.org/presentationml/2006/main">
+  <p:cSld>
+    <p:spTree>
+      <p:nvGrpSpPr>
+        <p:cNvPr id="1" name=""/>
+        <p:cNvGrpSpPr/>
+        <p:nvPr/>
+      </p:nvGrpSpPr>
+      <p:grpSpPr>
+        <a:xfrm>
+          <a:off x="0" y="0"/>
+          <a:ext cx="0" cy="0"/>
+          <a:chOff x="0" y="0"/>
+          <a:chExt cx="0" cy="0"/>
+        </a:xfrm>
+      </p:grpSpPr>
+      <p:sp>
+        <p:nvSpPr>
+          <p:cNvPr id="2" name="Title 1"/>
+          <p:cNvSpPr>
+            <a:spLocks noGrp="1"/>
+          </p:cNvSpPr>
+          <p:nvPr>
+            <p:ph type="title"/>
+          </p:nvPr>
+        </p:nvSpPr>
+        <p:spPr/>
+        <p:txBody>
+          <a:bodyPr/>
+          <a:lstStyle/>
+          <a:p>
+            <a:r>
+              <a:rPr lang="en-US" dirty="0" smtClean="0"/>
+              <a:t>Assert Q7</a:t>
+            </a:r>
+            <a:endParaRPr lang="en-US" dirty="0"/>
+          </a:p>
+        </p:txBody>
+      </p:sp>
+      <p:sp>
+        <p:nvSpPr>
+          <p:cNvPr id="3" name="Content Placeholder 2"/>
+          <p:cNvSpPr>
+            <a:spLocks noGrp="1"/>
+          </p:cNvSpPr>
+          <p:nvPr>
+            <p:ph idx="1"/>
+          </p:nvPr>
+        </p:nvSpPr>
+        <p:spPr/>
+        <p:txBody>
+          <a:bodyPr/>
+          <a:lstStyle/>
+          <a:p>
+            <a:r>
+              <a:rPr lang="en-US" sz="2800" dirty="0" smtClean="0"/>
+              <a:t>Take your answer from Q6 and let’s check if it returns true:</a:t>
+            </a:r>
+          </a:p>
+          <a:p>
+            <a:pPr lvl="1"/>
+            <a:r>
+              <a:rPr lang="en-US" sz="2400" dirty="0" smtClean="0"/>
+              <a:t>Tip:</a:t>
+            </a:r>
+          </a:p>
+          <a:p>
+            <a:pPr lvl="2"/>
+            <a:r>
+              <a:rPr lang="en-US" sz="2400" dirty="0" smtClean="0"/>
+              <a:t>Since we are returning a “</a:t>
+            </a:r>
+            <a:r>
+              <a:rPr lang="en-US" sz="2400" dirty="0" err="1" smtClean="0"/>
+              <a:t>TaskExecutionResult</a:t>
+            </a:r>
+            <a:r>
+              <a:rPr lang="en-US" sz="2400" dirty="0" smtClean="0"/>
+              <a:t>” we need to assert that type, not a bool.</a:t>
+            </a:r>
+            <a:endParaRPr lang="en-US" sz="2400" dirty="0"/>
+          </a:p>
+        </p:txBody>
+      </p:sp>
+    </p:spTree>
+    <p:extLst>
+      <p:ext uri="{BB962C8B-B14F-4D97-AF65-F5344CB8AC3E}">
+        <p14:creationId xmlns:p14="http://schemas.microsoft.com/office/powerpoint/2010/main" val="2807931447"/>
+      </p:ext>
+    </p:extLst>
+  </p:cSld>
+  <p:clrMapOvr>
+    <a:masterClrMapping/>
+  </p:clrMapOvr>
+</p:sld>
+</file>
+
+<file path=ppt/slides/slide11.xml><?xml version="1.0" encoding="utf-8"?>
+<p:sld xmlns:a="http://schemas.openxmlformats.org/drawingml/2006/main" xmlns:r="http://schemas.openxmlformats.org/officeDocument/2006/relationships" xmlns:p="http://schemas.openxmlformats.org/presentationml/2006/main">
+  <p:cSld>
+    <p:spTree>
+      <p:nvGrpSpPr>
+        <p:cNvPr id="1" name=""/>
+        <p:cNvGrpSpPr/>
+        <p:nvPr/>
+      </p:nvGrpSpPr>
+      <p:grpSpPr>
+        <a:xfrm>
+          <a:off x="0" y="0"/>
+          <a:ext cx="0" cy="0"/>
+          <a:chOff x="0" y="0"/>
+          <a:chExt cx="0" cy="0"/>
+        </a:xfrm>
+      </p:grpSpPr>
+      <p:sp>
+        <p:nvSpPr>
+          <p:cNvPr id="2" name="Title 1"/>
+          <p:cNvSpPr>
+            <a:spLocks noGrp="1"/>
+          </p:cNvSpPr>
+          <p:nvPr>
+            <p:ph type="title"/>
+          </p:nvPr>
+        </p:nvSpPr>
+        <p:spPr/>
+        <p:txBody>
+          <a:bodyPr/>
+          <a:lstStyle/>
+          <a:p>
+            <a:r>
+              <a:rPr lang="en-US" dirty="0" smtClean="0"/>
+              <a:t>Assert Q8</a:t>
+            </a:r>
+            <a:endParaRPr lang="en-US" dirty="0"/>
+          </a:p>
+        </p:txBody>
+      </p:sp>
+      <p:sp>
+        <p:nvSpPr>
+          <p:cNvPr id="3" name="Content Placeholder 2"/>
+          <p:cNvSpPr>
+            <a:spLocks noGrp="1"/>
+          </p:cNvSpPr>
+          <p:nvPr>
+            <p:ph idx="1"/>
+          </p:nvPr>
+        </p:nvSpPr>
+        <p:spPr/>
+        <p:txBody>
+          <a:bodyPr/>
+          <a:lstStyle/>
+          <a:p>
+            <a:r>
+              <a:rPr lang="en-US" sz="2800" dirty="0" smtClean="0"/>
+              <a:t>What if we have a collection that we want to compare?</a:t>
+            </a:r>
+          </a:p>
+          <a:p>
+            <a:pPr lvl="1"/>
+            <a:r>
+              <a:rPr lang="en-US" sz="2400" dirty="0" smtClean="0"/>
+              <a:t>Using “</a:t>
+            </a:r>
+            <a:r>
+              <a:rPr lang="en-US" sz="2400" dirty="0" err="1" smtClean="0"/>
+              <a:t>Assert.That</a:t>
+            </a:r>
+            <a:r>
+              <a:rPr lang="en-US" sz="2400" dirty="0" smtClean="0"/>
+              <a:t>”, compare </a:t>
+            </a:r>
+            <a:r>
+              <a:rPr lang="en-US" sz="2400" dirty="0" err="1" smtClean="0"/>
+              <a:t>IEnumerable</a:t>
+            </a:r>
+            <a:r>
+              <a:rPr lang="en-US" sz="2400" dirty="0" smtClean="0"/>
+              <a:t> </a:t>
+            </a:r>
+            <a:r>
+              <a:rPr lang="en-US" sz="2400" u="sng" dirty="0" smtClean="0">
+                <a:effectLst>
+                  <a:outerShdw blurRad="38100" dist="38100" dir="2700000" algn="tl">
+                    <a:srgbClr val="000000">
+                      <a:alpha val="43137"/>
+                    </a:srgbClr>
+                  </a:outerShdw>
+                </a:effectLst>
+              </a:rPr>
+              <a:t>answers</a:t>
+            </a:r>
+            <a:r>
+              <a:rPr lang="en-US" sz="2400" dirty="0" smtClean="0"/>
+              <a:t> to </a:t>
+            </a:r>
+            <a:r>
+              <a:rPr lang="en-US" sz="2400" dirty="0" err="1" smtClean="0"/>
+              <a:t>IEnumerable</a:t>
+            </a:r>
+            <a:r>
+              <a:rPr lang="en-US" sz="2400" dirty="0" smtClean="0"/>
+              <a:t> </a:t>
+            </a:r>
+            <a:r>
+              <a:rPr lang="en-US" sz="2400" u="sng" dirty="0" smtClean="0"/>
+              <a:t>results</a:t>
+            </a:r>
+            <a:r>
+              <a:rPr lang="en-US" sz="2400" dirty="0" smtClean="0"/>
+              <a:t>. </a:t>
+            </a:r>
+            <a:endParaRPr lang="en-US" sz="2400" dirty="0"/>
+          </a:p>
+        </p:txBody>
+      </p:sp>
+    </p:spTree>
+    <p:extLst>
+      <p:ext uri="{BB962C8B-B14F-4D97-AF65-F5344CB8AC3E}">
+        <p14:creationId xmlns:p14="http://schemas.microsoft.com/office/powerpoint/2010/main" val="4024686119"/>
+      </p:ext>
+    </p:extLst>
+  </p:cSld>
+  <p:clrMapOvr>
+    <a:masterClrMapping/>
+  </p:clrMapOvr>
+</p:sld>
+</file>
+
+<file path=ppt/slides/slide12.xml><?xml version="1.0" encoding="utf-8"?>
+<p:sld xmlns:a="http://schemas.openxmlformats.org/drawingml/2006/main" xmlns:r="http://schemas.openxmlformats.org/officeDocument/2006/relationships" xmlns:p="http://schemas.openxmlformats.org/presentationml/2006/main">
+  <p:cSld>
+    <p:spTree>
+      <p:nvGrpSpPr>
+        <p:cNvPr id="1" name=""/>
+        <p:cNvGrpSpPr/>
+        <p:nvPr/>
+      </p:nvGrpSpPr>
+      <p:grpSpPr>
+        <a:xfrm>
+          <a:off x="0" y="0"/>
+          <a:ext cx="0" cy="0"/>
+          <a:chOff x="0" y="0"/>
+          <a:chExt cx="0" cy="0"/>
+        </a:xfrm>
+      </p:grpSpPr>
+      <p:sp>
+        <p:nvSpPr>
+          <p:cNvPr id="2" name="Title 1"/>
+          <p:cNvSpPr>
+            <a:spLocks noGrp="1"/>
+          </p:cNvSpPr>
+          <p:nvPr>
+            <p:ph type="title"/>
+          </p:nvPr>
+        </p:nvSpPr>
+        <p:spPr/>
+        <p:txBody>
+          <a:bodyPr/>
+          <a:lstStyle/>
+          <a:p>
+            <a:r>
+              <a:rPr lang="en-US" dirty="0" smtClean="0"/>
+              <a:t>Assert Q9</a:t>
+            </a:r>
+            <a:endParaRPr lang="en-US" dirty="0"/>
+          </a:p>
+        </p:txBody>
+      </p:sp>
+      <p:sp>
+        <p:nvSpPr>
+          <p:cNvPr id="3" name="Content Placeholder 2"/>
+          <p:cNvSpPr>
+            <a:spLocks noGrp="1"/>
+          </p:cNvSpPr>
+          <p:nvPr>
+            <p:ph idx="1"/>
+          </p:nvPr>
+        </p:nvSpPr>
+        <p:spPr/>
+        <p:txBody>
+          <a:bodyPr>
+            <a:normAutofit/>
+          </a:bodyPr>
+          <a:lstStyle/>
+          <a:p>
+            <a:r>
+              <a:rPr lang="en-US" sz="2800" dirty="0" smtClean="0"/>
+              <a:t>Take the bool </a:t>
+            </a:r>
+            <a:r>
+              <a:rPr lang="en-US" sz="2800" u="sng" dirty="0" err="1" smtClean="0"/>
+              <a:t>isCorrect</a:t>
+            </a:r>
+            <a:r>
+              <a:rPr lang="en-US" sz="2800" dirty="0" smtClean="0"/>
+              <a:t> and assert that it’s false.</a:t>
+            </a:r>
+            <a:endParaRPr lang="en-US" sz="2800" dirty="0"/>
+          </a:p>
+        </p:txBody>
+      </p:sp>
+    </p:spTree>
+    <p:extLst>
+      <p:ext uri="{BB962C8B-B14F-4D97-AF65-F5344CB8AC3E}">
+        <p14:creationId xmlns:p14="http://schemas.microsoft.com/office/powerpoint/2010/main" val="1243913214"/>
+      </p:ext>
+    </p:extLst>
+  </p:cSld>
+  <p:clrMapOvr>
+    <a:masterClrMapping/>
+  </p:clrMapOvr>
+</p:sld>
+</file>
+
 <file path=ppt/slides/slide2.xml><?xml version="1.0" encoding="utf-8"?>
 <p:sld xmlns:a="http://schemas.openxmlformats.org/drawingml/2006/main" xmlns:r="http://schemas.openxmlformats.org/officeDocument/2006/relationships" xmlns:p="http://schemas.openxmlformats.org/presentationml/2006/main">
   <p:cSld>
@@ -4037,7 +4355,11 @@
           <a:p>
             <a:r>
               <a:rPr lang="en-US" dirty="0" smtClean="0"/>
-              <a:t>Act Q1</a:t>
+              <a:t>Act </a:t>
+            </a:r>
+            <a:r>
+              <a:rPr lang="en-US" dirty="0" smtClean="0"/>
+              <a:t>Q4</a:t>
             </a:r>
             <a:endParaRPr lang="en-US" dirty="0"/>
           </a:p>
@@ -4140,7 +4462,11 @@
           <a:p>
             <a:r>
               <a:rPr lang="en-US" dirty="0" smtClean="0"/>
-              <a:t>Act Q2</a:t>
+              <a:t>Act </a:t>
+            </a:r>
+            <a:r>
+              <a:rPr lang="en-US" dirty="0" smtClean="0"/>
+              <a:t>Q5</a:t>
             </a:r>
             <a:endParaRPr lang="en-US" dirty="0"/>
           </a:p>
@@ -4245,7 +4571,11 @@
           <a:p>
             <a:r>
               <a:rPr lang="en-US" dirty="0" smtClean="0"/>
-              <a:t>Act Q3</a:t>
+              <a:t>Act </a:t>
+            </a:r>
+            <a:r>
+              <a:rPr lang="en-US" dirty="0" smtClean="0"/>
+              <a:t>Q6</a:t>
             </a:r>
             <a:endParaRPr lang="en-US" dirty="0"/>
           </a:p>

</xml_diff>

<commit_message>
Add Q10 and refactor nav bar.
</commit_message>
<xml_diff>
--- a/It’s so easy, Tyler can do it.pptx
+++ b/It’s so easy, Tyler can do it.pptx
@@ -17,6 +17,8 @@
     <p:sldId id="266" r:id="rId11"/>
     <p:sldId id="267" r:id="rId12"/>
     <p:sldId id="268" r:id="rId13"/>
+    <p:sldId id="269" r:id="rId14"/>
+    <p:sldId id="270" r:id="rId15"/>
   </p:sldIdLst>
   <p:sldSz cx="12192000" cy="6858000"/>
   <p:notesSz cx="6858000" cy="9144000"/>
@@ -275,7 +277,7 @@
           <a:p>
             <a:fld id="{6A89FA28-2061-4CF2-9A1A-C9FDCD506C32}" type="datetimeFigureOut">
               <a:rPr lang="en-US" smtClean="0"/>
-              <a:t>10/13/2020</a:t>
+              <a:t>11/18/2020</a:t>
             </a:fld>
             <a:endParaRPr lang="en-US"/>
           </a:p>
@@ -518,7 +520,7 @@
           <a:p>
             <a:fld id="{6A89FA28-2061-4CF2-9A1A-C9FDCD506C32}" type="datetimeFigureOut">
               <a:rPr lang="en-US" smtClean="0"/>
-              <a:t>10/13/2020</a:t>
+              <a:t>11/18/2020</a:t>
             </a:fld>
             <a:endParaRPr lang="en-US"/>
           </a:p>
@@ -698,7 +700,7 @@
           <a:p>
             <a:fld id="{6A89FA28-2061-4CF2-9A1A-C9FDCD506C32}" type="datetimeFigureOut">
               <a:rPr lang="en-US" smtClean="0"/>
-              <a:t>10/13/2020</a:t>
+              <a:t>11/18/2020</a:t>
             </a:fld>
             <a:endParaRPr lang="en-US"/>
           </a:p>
@@ -903,7 +905,7 @@
           <a:p>
             <a:fld id="{6A89FA28-2061-4CF2-9A1A-C9FDCD506C32}" type="datetimeFigureOut">
               <a:rPr lang="en-US" smtClean="0"/>
-              <a:t>10/13/2020</a:t>
+              <a:t>11/18/2020</a:t>
             </a:fld>
             <a:endParaRPr lang="en-US"/>
           </a:p>
@@ -1160,7 +1162,7 @@
           <a:p>
             <a:fld id="{6A89FA28-2061-4CF2-9A1A-C9FDCD506C32}" type="datetimeFigureOut">
               <a:rPr lang="en-US" smtClean="0"/>
-              <a:t>10/13/2020</a:t>
+              <a:t>11/18/2020</a:t>
             </a:fld>
             <a:endParaRPr lang="en-US"/>
           </a:p>
@@ -1507,7 +1509,7 @@
           <a:p>
             <a:fld id="{6A89FA28-2061-4CF2-9A1A-C9FDCD506C32}" type="datetimeFigureOut">
               <a:rPr lang="en-US" smtClean="0"/>
-              <a:t>10/13/2020</a:t>
+              <a:t>11/18/2020</a:t>
             </a:fld>
             <a:endParaRPr lang="en-US"/>
           </a:p>
@@ -1909,7 +1911,7 @@
           <a:p>
             <a:fld id="{6A89FA28-2061-4CF2-9A1A-C9FDCD506C32}" type="datetimeFigureOut">
               <a:rPr lang="en-US" smtClean="0"/>
-              <a:t>10/13/2020</a:t>
+              <a:t>11/18/2020</a:t>
             </a:fld>
             <a:endParaRPr lang="en-US"/>
           </a:p>
@@ -2027,7 +2029,7 @@
           <a:p>
             <a:fld id="{6A89FA28-2061-4CF2-9A1A-C9FDCD506C32}" type="datetimeFigureOut">
               <a:rPr lang="en-US" smtClean="0"/>
-              <a:t>10/13/2020</a:t>
+              <a:t>11/18/2020</a:t>
             </a:fld>
             <a:endParaRPr lang="en-US"/>
           </a:p>
@@ -2122,7 +2124,7 @@
           <a:p>
             <a:fld id="{6A89FA28-2061-4CF2-9A1A-C9FDCD506C32}" type="datetimeFigureOut">
               <a:rPr lang="en-US" smtClean="0"/>
-              <a:t>10/13/2020</a:t>
+              <a:t>11/18/2020</a:t>
             </a:fld>
             <a:endParaRPr lang="en-US"/>
           </a:p>
@@ -2412,7 +2414,7 @@
           <a:p>
             <a:fld id="{6A89FA28-2061-4CF2-9A1A-C9FDCD506C32}" type="datetimeFigureOut">
               <a:rPr lang="en-US" smtClean="0"/>
-              <a:t>10/13/2020</a:t>
+              <a:t>11/18/2020</a:t>
             </a:fld>
             <a:endParaRPr lang="en-US"/>
           </a:p>
@@ -2692,7 +2694,7 @@
           <a:p>
             <a:fld id="{6A89FA28-2061-4CF2-9A1A-C9FDCD506C32}" type="datetimeFigureOut">
               <a:rPr lang="en-US" smtClean="0"/>
-              <a:t>10/13/2020</a:t>
+              <a:t>11/18/2020</a:t>
             </a:fld>
             <a:endParaRPr lang="en-US"/>
           </a:p>
@@ -2942,7 +2944,7 @@
           <a:p>
             <a:fld id="{6A89FA28-2061-4CF2-9A1A-C9FDCD506C32}" type="datetimeFigureOut">
               <a:rPr lang="en-US" smtClean="0"/>
-              <a:t>10/13/2020</a:t>
+              <a:t>11/18/2020</a:t>
             </a:fld>
             <a:endParaRPr lang="en-US"/>
           </a:p>
@@ -3818,6 +3820,276 @@
 </p:sld>
 </file>
 
+<file path=ppt/slides/slide13.xml><?xml version="1.0" encoding="utf-8"?>
+<p:sld xmlns:a="http://schemas.openxmlformats.org/drawingml/2006/main" xmlns:r="http://schemas.openxmlformats.org/officeDocument/2006/relationships" xmlns:p="http://schemas.openxmlformats.org/presentationml/2006/main">
+  <p:cSld>
+    <p:spTree>
+      <p:nvGrpSpPr>
+        <p:cNvPr id="1" name=""/>
+        <p:cNvGrpSpPr/>
+        <p:nvPr/>
+      </p:nvGrpSpPr>
+      <p:grpSpPr>
+        <a:xfrm>
+          <a:off x="0" y="0"/>
+          <a:ext cx="0" cy="0"/>
+          <a:chOff x="0" y="0"/>
+          <a:chExt cx="0" cy="0"/>
+        </a:xfrm>
+      </p:grpSpPr>
+      <p:sp>
+        <p:nvSpPr>
+          <p:cNvPr id="2" name="Title 1"/>
+          <p:cNvSpPr>
+            <a:spLocks noGrp="1"/>
+          </p:cNvSpPr>
+          <p:nvPr>
+            <p:ph type="title"/>
+          </p:nvPr>
+        </p:nvSpPr>
+        <p:spPr/>
+        <p:txBody>
+          <a:bodyPr/>
+          <a:lstStyle/>
+          <a:p>
+            <a:r>
+              <a:rPr lang="en-US" dirty="0" smtClean="0"/>
+              <a:t>Question 10</a:t>
+            </a:r>
+            <a:endParaRPr lang="en-US" dirty="0"/>
+          </a:p>
+        </p:txBody>
+      </p:sp>
+      <p:sp>
+        <p:nvSpPr>
+          <p:cNvPr id="3" name="Content Placeholder 2"/>
+          <p:cNvSpPr>
+            <a:spLocks noGrp="1"/>
+          </p:cNvSpPr>
+          <p:nvPr>
+            <p:ph sz="half" idx="1"/>
+          </p:nvPr>
+        </p:nvSpPr>
+        <p:spPr/>
+        <p:txBody>
+          <a:bodyPr/>
+          <a:lstStyle/>
+          <a:p>
+            <a:r>
+              <a:rPr lang="en-US" dirty="0" smtClean="0"/>
+              <a:t>In the UI solution, first start by adjusting the </a:t>
+            </a:r>
+            <a:r>
+              <a:rPr lang="en-US" dirty="0" err="1" smtClean="0"/>
+              <a:t>App.Config</a:t>
+            </a:r>
+            <a:r>
+              <a:rPr lang="en-US" dirty="0" smtClean="0"/>
+              <a:t> file with your app server/web server names.</a:t>
+            </a:r>
+          </a:p>
+          <a:p>
+            <a:r>
+              <a:rPr lang="en-US" dirty="0" smtClean="0"/>
+              <a:t>I want you to write a UI test in the Smoke Test </a:t>
+            </a:r>
+            <a:r>
+              <a:rPr lang="en-US" dirty="0" err="1" smtClean="0"/>
+              <a:t>test</a:t>
+            </a:r>
+            <a:r>
+              <a:rPr lang="en-US" dirty="0" smtClean="0"/>
+              <a:t> plan. </a:t>
+            </a:r>
+          </a:p>
+          <a:p>
+            <a:r>
+              <a:rPr lang="en-US" dirty="0" smtClean="0"/>
+              <a:t>“Verify that the number of documents in the Queue matches what you created.”</a:t>
+            </a:r>
+          </a:p>
+          <a:p>
+            <a:r>
+              <a:rPr lang="en-US" dirty="0" smtClean="0"/>
+              <a:t>LET ME KNOW IF YOU NEED HELP! This is a very difficult task if you don’t know exactly what you’re doing. </a:t>
+            </a:r>
+            <a:endParaRPr lang="en-US" dirty="0"/>
+          </a:p>
+        </p:txBody>
+      </p:sp>
+      <p:sp>
+        <p:nvSpPr>
+          <p:cNvPr id="4" name="Content Placeholder 3"/>
+          <p:cNvSpPr>
+            <a:spLocks noGrp="1"/>
+          </p:cNvSpPr>
+          <p:nvPr>
+            <p:ph sz="half" idx="2"/>
+          </p:nvPr>
+        </p:nvSpPr>
+        <p:spPr/>
+        <p:txBody>
+          <a:bodyPr/>
+          <a:lstStyle/>
+          <a:p>
+            <a:r>
+              <a:rPr lang="en-US" dirty="0"/>
+              <a:t>Workflow opens, you can click on a LC to expand it, open the Q, then count how many documents are in the Q</a:t>
+            </a:r>
+            <a:r>
+              <a:rPr lang="en-US" dirty="0" smtClean="0"/>
+              <a:t>.</a:t>
+            </a:r>
+          </a:p>
+          <a:p>
+            <a:r>
+              <a:rPr lang="en-US" dirty="0" smtClean="0"/>
+              <a:t>Start with creating an user group, user, document type (keywords not necessary), LC, Q.</a:t>
+            </a:r>
+          </a:p>
+          <a:p>
+            <a:r>
+              <a:rPr lang="en-US" dirty="0" smtClean="0"/>
+              <a:t>Don’t forget to Drop the Cache!</a:t>
+            </a:r>
+          </a:p>
+          <a:p>
+            <a:r>
+              <a:rPr lang="en-US" dirty="0" smtClean="0"/>
+              <a:t>Add the </a:t>
+            </a:r>
+            <a:r>
+              <a:rPr lang="en-US" dirty="0" err="1" smtClean="0"/>
+              <a:t>config</a:t>
+            </a:r>
+            <a:r>
+              <a:rPr lang="en-US" dirty="0" smtClean="0"/>
+              <a:t> items to the Registry Dictionary</a:t>
+            </a:r>
+          </a:p>
+          <a:p>
+            <a:r>
+              <a:rPr lang="en-US" dirty="0" smtClean="0"/>
+              <a:t>Write the test.</a:t>
+            </a:r>
+            <a:endParaRPr lang="en-US" dirty="0"/>
+          </a:p>
+          <a:p>
+            <a:endParaRPr lang="en-US" dirty="0"/>
+          </a:p>
+        </p:txBody>
+      </p:sp>
+    </p:spTree>
+    <p:extLst>
+      <p:ext uri="{BB962C8B-B14F-4D97-AF65-F5344CB8AC3E}">
+        <p14:creationId xmlns:p14="http://schemas.microsoft.com/office/powerpoint/2010/main" val="576884837"/>
+      </p:ext>
+    </p:extLst>
+  </p:cSld>
+  <p:clrMapOvr>
+    <a:masterClrMapping/>
+  </p:clrMapOvr>
+</p:sld>
+</file>
+
+<file path=ppt/slides/slide14.xml><?xml version="1.0" encoding="utf-8"?>
+<p:sld xmlns:a="http://schemas.openxmlformats.org/drawingml/2006/main" xmlns:r="http://schemas.openxmlformats.org/officeDocument/2006/relationships" xmlns:p="http://schemas.openxmlformats.org/presentationml/2006/main">
+  <p:cSld>
+    <p:spTree>
+      <p:nvGrpSpPr>
+        <p:cNvPr id="1" name=""/>
+        <p:cNvGrpSpPr/>
+        <p:nvPr/>
+      </p:nvGrpSpPr>
+      <p:grpSpPr>
+        <a:xfrm>
+          <a:off x="0" y="0"/>
+          <a:ext cx="0" cy="0"/>
+          <a:chOff x="0" y="0"/>
+          <a:chExt cx="0" cy="0"/>
+        </a:xfrm>
+      </p:grpSpPr>
+      <p:sp>
+        <p:nvSpPr>
+          <p:cNvPr id="2" name="Title 1"/>
+          <p:cNvSpPr>
+            <a:spLocks noGrp="1"/>
+          </p:cNvSpPr>
+          <p:nvPr>
+            <p:ph type="title"/>
+          </p:nvPr>
+        </p:nvSpPr>
+        <p:spPr/>
+        <p:txBody>
+          <a:bodyPr/>
+          <a:lstStyle/>
+          <a:p>
+            <a:r>
+              <a:rPr lang="en-US" dirty="0" smtClean="0"/>
+              <a:t>Tips for Q10</a:t>
+            </a:r>
+            <a:endParaRPr lang="en-US" dirty="0"/>
+          </a:p>
+        </p:txBody>
+      </p:sp>
+      <p:sp>
+        <p:nvSpPr>
+          <p:cNvPr id="3" name="Content Placeholder 2"/>
+          <p:cNvSpPr>
+            <a:spLocks noGrp="1"/>
+          </p:cNvSpPr>
+          <p:nvPr>
+            <p:ph idx="1"/>
+          </p:nvPr>
+        </p:nvSpPr>
+        <p:spPr/>
+        <p:txBody>
+          <a:bodyPr/>
+          <a:lstStyle/>
+          <a:p>
+            <a:r>
+              <a:rPr lang="en-US" dirty="0" smtClean="0"/>
+              <a:t>Comment out the test files you are not using in the </a:t>
+            </a:r>
+            <a:r>
+              <a:rPr lang="en-US" dirty="0" err="1" smtClean="0"/>
+              <a:t>SmokeTestRegistry</a:t>
+            </a:r>
+            <a:r>
+              <a:rPr lang="en-US" dirty="0" smtClean="0"/>
+              <a:t> class so you don’t have to wait forever for the tests to create their configuration.</a:t>
+            </a:r>
+          </a:p>
+          <a:p>
+            <a:r>
+              <a:rPr lang="en-US" dirty="0" smtClean="0"/>
+              <a:t>Don’t forget to add your test to the top of the class in the Initialize method.</a:t>
+            </a:r>
+          </a:p>
+          <a:p>
+            <a:r>
+              <a:rPr lang="en-US" dirty="0" smtClean="0"/>
+              <a:t>Feel free to look at tests in the solution for reference. </a:t>
+            </a:r>
+          </a:p>
+          <a:p>
+            <a:endParaRPr lang="en-US" dirty="0"/>
+          </a:p>
+        </p:txBody>
+      </p:sp>
+    </p:spTree>
+    <p:extLst>
+      <p:ext uri="{BB962C8B-B14F-4D97-AF65-F5344CB8AC3E}">
+        <p14:creationId xmlns:p14="http://schemas.microsoft.com/office/powerpoint/2010/main" val="2830722358"/>
+      </p:ext>
+    </p:extLst>
+  </p:cSld>
+  <p:clrMapOvr>
+    <a:masterClrMapping/>
+  </p:clrMapOvr>
+</p:sld>
+</file>
+
 <file path=ppt/slides/slide2.xml><?xml version="1.0" encoding="utf-8"?>
 <p:sld xmlns:a="http://schemas.openxmlformats.org/drawingml/2006/main" xmlns:r="http://schemas.openxmlformats.org/officeDocument/2006/relationships" xmlns:p="http://schemas.openxmlformats.org/presentationml/2006/main">
   <p:cSld>
@@ -4355,11 +4627,7 @@
           <a:p>
             <a:r>
               <a:rPr lang="en-US" dirty="0" smtClean="0"/>
-              <a:t>Act </a:t>
-            </a:r>
-            <a:r>
-              <a:rPr lang="en-US" dirty="0" smtClean="0"/>
-              <a:t>Q4</a:t>
+              <a:t>Act Q4</a:t>
             </a:r>
             <a:endParaRPr lang="en-US" dirty="0"/>
           </a:p>
@@ -4462,11 +4730,7 @@
           <a:p>
             <a:r>
               <a:rPr lang="en-US" dirty="0" smtClean="0"/>
-              <a:t>Act </a:t>
-            </a:r>
-            <a:r>
-              <a:rPr lang="en-US" dirty="0" smtClean="0"/>
-              <a:t>Q5</a:t>
+              <a:t>Act Q5</a:t>
             </a:r>
             <a:endParaRPr lang="en-US" dirty="0"/>
           </a:p>
@@ -4571,11 +4835,7 @@
           <a:p>
             <a:r>
               <a:rPr lang="en-US" dirty="0" smtClean="0"/>
-              <a:t>Act </a:t>
-            </a:r>
-            <a:r>
-              <a:rPr lang="en-US" dirty="0" smtClean="0"/>
-              <a:t>Q6</a:t>
+              <a:t>Act Q6</a:t>
             </a:r>
             <a:endParaRPr lang="en-US" dirty="0"/>
           </a:p>

</xml_diff>